<commit_message>
add the figure of content 2
</commit_message>
<xml_diff>
--- a/images/ch2_2Btest.pptx
+++ b/images/ch2_2Btest.pptx
@@ -5551,10 +5551,16 @@
           </a:bodyPr>
           <a:p>
             <a:r>
-              <a:rPr lang="zh-CN" altLang="en-US" sz="1400"/>
+              <a:rPr lang="zh-CN" altLang="en-US" sz="1400">
+                <a:latin typeface="宋体" panose="02010600030101010101" pitchFamily="2" charset="-122"/>
+                <a:ea typeface="宋体" panose="02010600030101010101" pitchFamily="2" charset="-122"/>
+              </a:rPr>
               <a:t>测试反馈</a:t>
             </a:r>
-            <a:endParaRPr lang="zh-CN" altLang="en-US" sz="1400"/>
+            <a:endParaRPr lang="zh-CN" altLang="en-US" sz="1400">
+              <a:latin typeface="宋体" panose="02010600030101010101" pitchFamily="2" charset="-122"/>
+              <a:ea typeface="宋体" panose="02010600030101010101" pitchFamily="2" charset="-122"/>
+            </a:endParaRPr>
           </a:p>
         </p:txBody>
       </p:sp>
@@ -5566,8 +5572,8 @@
         </p:nvSpPr>
         <p:spPr>
           <a:xfrm>
-            <a:off x="758190" y="2922905"/>
-            <a:ext cx="459740" cy="1005840"/>
+            <a:off x="853440" y="3025775"/>
+            <a:ext cx="398145" cy="802640"/>
           </a:xfrm>
           <a:prstGeom prst="rect">
             <a:avLst/>
@@ -5580,10 +5586,16 @@
           </a:bodyPr>
           <a:p>
             <a:r>
-              <a:rPr lang="zh-CN" altLang="en-US"/>
+              <a:rPr lang="zh-CN" altLang="en-US" sz="1400">
+                <a:latin typeface="宋体" panose="02010600030101010101" pitchFamily="2" charset="-122"/>
+                <a:ea typeface="宋体" panose="02010600030101010101" pitchFamily="2" charset="-122"/>
+              </a:rPr>
               <a:t>黑盒模型</a:t>
             </a:r>
-            <a:endParaRPr lang="zh-CN" altLang="en-US"/>
+            <a:endParaRPr lang="zh-CN" altLang="en-US" sz="1400">
+              <a:latin typeface="宋体" panose="02010600030101010101" pitchFamily="2" charset="-122"/>
+              <a:ea typeface="宋体" panose="02010600030101010101" pitchFamily="2" charset="-122"/>
+            </a:endParaRPr>
           </a:p>
         </p:txBody>
       </p:sp>

</xml_diff>

<commit_message>
refine figures and ch1
</commit_message>
<xml_diff>
--- a/images/ch2_2Btest.pptx
+++ b/images/ch2_2Btest.pptx
@@ -5510,6 +5510,10 @@
             </a:avLst>
           </a:prstGeom>
           <a:ln>
+            <a:solidFill>
+              <a:schemeClr val="tx1"/>
+            </a:solidFill>
+            <a:prstDash val="sysDot"/>
             <a:headEnd type="none" w="med" len="med"/>
             <a:tailEnd type="triangle" w="med" len="med"/>
           </a:ln>
@@ -5552,14 +5556,14 @@
           <a:p>
             <a:r>
               <a:rPr lang="zh-CN" altLang="en-US" sz="1400">
-                <a:latin typeface="宋体" panose="02010600030101010101" pitchFamily="2" charset="-122"/>
-                <a:ea typeface="宋体" panose="02010600030101010101" pitchFamily="2" charset="-122"/>
+                <a:latin typeface="楷体" panose="02010609060101010101" charset="-122"/>
+                <a:ea typeface="楷体" panose="02010609060101010101" charset="-122"/>
               </a:rPr>
               <a:t>测试反馈</a:t>
             </a:r>
             <a:endParaRPr lang="zh-CN" altLang="en-US" sz="1400">
-              <a:latin typeface="宋体" panose="02010600030101010101" pitchFamily="2" charset="-122"/>
-              <a:ea typeface="宋体" panose="02010600030101010101" pitchFamily="2" charset="-122"/>
+              <a:latin typeface="楷体" panose="02010609060101010101" charset="-122"/>
+              <a:ea typeface="楷体" panose="02010609060101010101" charset="-122"/>
             </a:endParaRPr>
           </a:p>
         </p:txBody>

</xml_diff>